<commit_message>
Add presentation file for project overview
</commit_message>
<xml_diff>
--- a/PRESENTAZIONE.pptx
+++ b/PRESENTAZIONE.pptx
@@ -3377,7 +3377,7 @@
           </p:nvCxnSpPr>
           <p:spPr>
             <a:xfrm>
-              <a:off x="4334231" y="3614217"/>
+              <a:off x="4334231" y="3624348"/>
               <a:ext cx="722632" cy="0"/>
             </a:xfrm>
             <a:prstGeom prst="line">
@@ -3596,12 +3596,47 @@
           <a:chExt cx="0" cy="0"/>
         </a:xfrm>
       </p:grpSpPr>
+      <p:sp>
+        <p:nvSpPr>
+          <p:cNvPr id="7" name="CasellaDiTesto 6">
+            <a:extLst>
+              <a:ext uri="{FF2B5EF4-FFF2-40B4-BE49-F238E27FC236}">
+                <a16:creationId xmlns:a16="http://schemas.microsoft.com/office/drawing/2014/main" id="{055DF895-3448-2D37-9927-7B466C1F0F39}"/>
+              </a:ext>
+            </a:extLst>
+          </p:cNvPr>
+          <p:cNvSpPr txBox="1"/>
+          <p:nvPr/>
+        </p:nvSpPr>
+        <p:spPr>
+          <a:xfrm>
+            <a:off x="1571328" y="243068"/>
+            <a:ext cx="6958556" cy="372319"/>
+          </a:xfrm>
+          <a:prstGeom prst="rect">
+            <a:avLst/>
+          </a:prstGeom>
+          <a:noFill/>
+        </p:spPr>
+        <p:txBody>
+          <a:bodyPr wrap="square" rtlCol="0">
+            <a:spAutoFit/>
+          </a:bodyPr>
+          <a:lstStyle/>
+          <a:p>
+            <a:r>
+              <a:rPr lang="it-IT" dirty="0"/>
+              <a:t>Evoluzione della disoccupazione in relazione alle crisi  giovani - adulti</a:t>
+            </a:r>
+          </a:p>
+        </p:txBody>
+      </p:sp>
       <p:pic>
         <p:nvPicPr>
-          <p:cNvPr id="5" name="Immagine 4" descr="Immagine che contiene diagramma, Diagramma, linea&#10;&#10;Descrizione generata automaticamente">
+          <p:cNvPr id="3" name="Immagine 2" descr="Immagine che contiene diagramma, Diagramma, linea, testo&#10;&#10;Descrizione generata automaticamente">
             <a:extLst>
               <a:ext uri="{FF2B5EF4-FFF2-40B4-BE49-F238E27FC236}">
-                <a16:creationId xmlns:a16="http://schemas.microsoft.com/office/drawing/2014/main" id="{D18FB67B-9FA2-0953-3CD2-537AA6ABD1AC}"/>
+                <a16:creationId xmlns:a16="http://schemas.microsoft.com/office/drawing/2014/main" id="{256C8BA2-78A5-6EA8-95B0-F8903D666AB5}"/>
               </a:ext>
             </a:extLst>
           </p:cNvPr>
@@ -3618,13 +3653,13 @@
               </a:ext>
             </a:extLst>
           </a:blip>
-          <a:srcRect r="15453"/>
+          <a:srcRect r="15809"/>
           <a:stretch/>
         </p:blipFill>
         <p:spPr>
           <a:xfrm>
-            <a:off x="386681" y="1449000"/>
-            <a:ext cx="5043292" cy="3960000"/>
+            <a:off x="289667" y="1448999"/>
+            <a:ext cx="5022061" cy="3960000"/>
           </a:xfrm>
           <a:prstGeom prst="rect">
             <a:avLst/>
@@ -3633,10 +3668,10 @@
       </p:pic>
       <p:pic>
         <p:nvPicPr>
-          <p:cNvPr id="6" name="Immagine 5" descr="Immagine che contiene diagramma, Diagramma, linea&#10;&#10;Descrizione generata automaticamente">
+          <p:cNvPr id="8" name="Immagine 7" descr="Immagine che contiene diagramma, Diagramma, linea, testo&#10;&#10;Descrizione generata automaticamente">
             <a:extLst>
               <a:ext uri="{FF2B5EF4-FFF2-40B4-BE49-F238E27FC236}">
-                <a16:creationId xmlns:a16="http://schemas.microsoft.com/office/drawing/2014/main" id="{EA7AAD2D-C50C-82CC-9E73-52BEEC3EFAB5}"/>
+                <a16:creationId xmlns:a16="http://schemas.microsoft.com/office/drawing/2014/main" id="{C84EC18A-D8E1-4B2E-A9BB-253DA9B18BD8}"/>
               </a:ext>
             </a:extLst>
           </p:cNvPr>
@@ -3653,60 +3688,25 @@
               </a:ext>
             </a:extLst>
           </a:blip>
-          <a:srcRect l="87105" b="21378"/>
+          <a:srcRect l="86881" b="21595"/>
           <a:stretch/>
         </p:blipFill>
         <p:spPr>
           <a:xfrm>
-            <a:off x="5429973" y="838166"/>
-            <a:ext cx="1332054" cy="5391873"/>
+            <a:off x="5418398" y="740484"/>
+            <a:ext cx="1355203" cy="5377031"/>
           </a:xfrm>
           <a:prstGeom prst="rect">
             <a:avLst/>
           </a:prstGeom>
         </p:spPr>
       </p:pic>
-      <p:sp>
-        <p:nvSpPr>
-          <p:cNvPr id="7" name="CasellaDiTesto 6">
+      <p:pic>
+        <p:nvPicPr>
+          <p:cNvPr id="10" name="Immagine 9" descr="Immagine che contiene testo, diagramma, Diagramma, linea&#10;&#10;Descrizione generata automaticamente">
             <a:extLst>
               <a:ext uri="{FF2B5EF4-FFF2-40B4-BE49-F238E27FC236}">
-                <a16:creationId xmlns:a16="http://schemas.microsoft.com/office/drawing/2014/main" id="{055DF895-3448-2D37-9927-7B466C1F0F39}"/>
-              </a:ext>
-            </a:extLst>
-          </p:cNvPr>
-          <p:cNvSpPr txBox="1"/>
-          <p:nvPr/>
-        </p:nvSpPr>
-        <p:spPr>
-          <a:xfrm>
-            <a:off x="1571328" y="243068"/>
-            <a:ext cx="6958556" cy="372319"/>
-          </a:xfrm>
-          <a:prstGeom prst="rect">
-            <a:avLst/>
-          </a:prstGeom>
-          <a:noFill/>
-        </p:spPr>
-        <p:txBody>
-          <a:bodyPr wrap="square" rtlCol="0">
-            <a:spAutoFit/>
-          </a:bodyPr>
-          <a:lstStyle/>
-          <a:p>
-            <a:r>
-              <a:rPr lang="it-IT" dirty="0"/>
-              <a:t>Evoluzione della disoccupazione in relazione alle crisi  giovani - adulti</a:t>
-            </a:r>
-          </a:p>
-        </p:txBody>
-      </p:sp>
-      <p:pic>
-        <p:nvPicPr>
-          <p:cNvPr id="4" name="Immagine 3" descr="Immagine che contiene testo, diagramma, Diagramma, linea&#10;&#10;Descrizione generata automaticamente">
-            <a:extLst>
-              <a:ext uri="{FF2B5EF4-FFF2-40B4-BE49-F238E27FC236}">
-                <a16:creationId xmlns:a16="http://schemas.microsoft.com/office/drawing/2014/main" id="{5C422D08-9773-F1C4-3BA7-335AEFCF9394}"/>
+                <a16:creationId xmlns:a16="http://schemas.microsoft.com/office/drawing/2014/main" id="{1C28BB13-AA4B-1557-AD41-438B3A4CDAD8}"/>
               </a:ext>
             </a:extLst>
           </p:cNvPr>
@@ -3723,13 +3723,13 @@
               </a:ext>
             </a:extLst>
           </a:blip>
-          <a:srcRect r="14866"/>
+          <a:srcRect r="15961"/>
           <a:stretch/>
         </p:blipFill>
         <p:spPr>
           <a:xfrm>
-            <a:off x="6762027" y="1449000"/>
-            <a:ext cx="5087024" cy="3960000"/>
+            <a:off x="6773601" y="1448999"/>
+            <a:ext cx="5012971" cy="3960000"/>
           </a:xfrm>
           <a:prstGeom prst="rect">
             <a:avLst/>

</xml_diff>